<commit_message>
drawKids and connect with connectors
problems: connectors do not have text. add intermediate textboxses may help
</commit_message>
<xml_diff>
--- a/graph.pptx
+++ b/graph.pptx
@@ -233,7 +233,7 @@
             <a:fld id="{E3A52414-35A0-42DF-BB16-BC48DD02CE33}" type="datetimeFigureOut">
               <a:rPr lang="en-US" smtClean="0"/>
               <a:pPr/>
-              <a:t>12/16/2018</a:t>
+              <a:t>12/17/2018</a:t>
             </a:fld>
             <a:endParaRPr lang="en-US"/>
           </a:p>
@@ -400,7 +400,7 @@
             <a:fld id="{B6B2D00D-774E-4257-B249-00B5460D641A}" type="datetimeFigureOut">
               <a:rPr lang="de-DE" smtClean="0"/>
               <a:pPr/>
-              <a:t>16.12.2018</a:t>
+              <a:t>17.12.2018</a:t>
             </a:fld>
             <a:endParaRPr lang="de-DE"/>
           </a:p>
@@ -850,7 +850,7 @@
             <a:fld id="{28723C7C-1933-4B7D-A8D3-78EE0323587D}" type="datetimeFigureOut">
               <a:rPr lang="de-DE" smtClean="0"/>
               <a:pPr/>
-              <a:t>16.12.2018</a:t>
+              <a:t>17.12.2018</a:t>
             </a:fld>
             <a:endParaRPr lang="de-DE"/>
           </a:p>
@@ -1015,7 +1015,7 @@
             <a:fld id="{28723C7C-1933-4B7D-A8D3-78EE0323587D}" type="datetimeFigureOut">
               <a:rPr lang="de-DE" smtClean="0"/>
               <a:pPr/>
-              <a:t>16.12.2018</a:t>
+              <a:t>17.12.2018</a:t>
             </a:fld>
             <a:endParaRPr lang="de-DE"/>
           </a:p>
@@ -1190,7 +1190,7 @@
             <a:fld id="{28723C7C-1933-4B7D-A8D3-78EE0323587D}" type="datetimeFigureOut">
               <a:rPr lang="de-DE" smtClean="0"/>
               <a:pPr/>
-              <a:t>16.12.2018</a:t>
+              <a:t>17.12.2018</a:t>
             </a:fld>
             <a:endParaRPr lang="de-DE"/>
           </a:p>
@@ -1355,7 +1355,7 @@
             <a:fld id="{28723C7C-1933-4B7D-A8D3-78EE0323587D}" type="datetimeFigureOut">
               <a:rPr lang="de-DE" smtClean="0"/>
               <a:pPr/>
-              <a:t>16.12.2018</a:t>
+              <a:t>17.12.2018</a:t>
             </a:fld>
             <a:endParaRPr lang="de-DE"/>
           </a:p>
@@ -1597,7 +1597,7 @@
             <a:fld id="{28723C7C-1933-4B7D-A8D3-78EE0323587D}" type="datetimeFigureOut">
               <a:rPr lang="de-DE" smtClean="0"/>
               <a:pPr/>
-              <a:t>16.12.2018</a:t>
+              <a:t>17.12.2018</a:t>
             </a:fld>
             <a:endParaRPr lang="de-DE"/>
           </a:p>
@@ -1879,7 +1879,7 @@
             <a:fld id="{28723C7C-1933-4B7D-A8D3-78EE0323587D}" type="datetimeFigureOut">
               <a:rPr lang="de-DE" smtClean="0"/>
               <a:pPr/>
-              <a:t>16.12.2018</a:t>
+              <a:t>17.12.2018</a:t>
             </a:fld>
             <a:endParaRPr lang="de-DE"/>
           </a:p>
@@ -2295,7 +2295,7 @@
             <a:fld id="{28723C7C-1933-4B7D-A8D3-78EE0323587D}" type="datetimeFigureOut">
               <a:rPr lang="de-DE" smtClean="0"/>
               <a:pPr/>
-              <a:t>16.12.2018</a:t>
+              <a:t>17.12.2018</a:t>
             </a:fld>
             <a:endParaRPr lang="de-DE"/>
           </a:p>
@@ -2409,7 +2409,7 @@
             <a:fld id="{28723C7C-1933-4B7D-A8D3-78EE0323587D}" type="datetimeFigureOut">
               <a:rPr lang="de-DE" smtClean="0"/>
               <a:pPr/>
-              <a:t>16.12.2018</a:t>
+              <a:t>17.12.2018</a:t>
             </a:fld>
             <a:endParaRPr lang="de-DE"/>
           </a:p>
@@ -2501,7 +2501,7 @@
             <a:fld id="{28723C7C-1933-4B7D-A8D3-78EE0323587D}" type="datetimeFigureOut">
               <a:rPr lang="de-DE" smtClean="0"/>
               <a:pPr/>
-              <a:t>16.12.2018</a:t>
+              <a:t>17.12.2018</a:t>
             </a:fld>
             <a:endParaRPr lang="de-DE"/>
           </a:p>
@@ -2773,7 +2773,7 @@
             <a:fld id="{28723C7C-1933-4B7D-A8D3-78EE0323587D}" type="datetimeFigureOut">
               <a:rPr lang="de-DE" smtClean="0"/>
               <a:pPr/>
-              <a:t>16.12.2018</a:t>
+              <a:t>17.12.2018</a:t>
             </a:fld>
             <a:endParaRPr lang="de-DE"/>
           </a:p>
@@ -3022,7 +3022,7 @@
             <a:fld id="{28723C7C-1933-4B7D-A8D3-78EE0323587D}" type="datetimeFigureOut">
               <a:rPr lang="de-DE" smtClean="0"/>
               <a:pPr/>
-              <a:t>16.12.2018</a:t>
+              <a:t>17.12.2018</a:t>
             </a:fld>
             <a:endParaRPr lang="de-DE"/>
           </a:p>
@@ -3230,7 +3230,7 @@
             <a:fld id="{28723C7C-1933-4B7D-A8D3-78EE0323587D}" type="datetimeFigureOut">
               <a:rPr lang="de-DE" smtClean="0"/>
               <a:pPr/>
-              <a:t>16.12.2018</a:t>
+              <a:t>17.12.2018</a:t>
             </a:fld>
             <a:endParaRPr lang="de-DE"/>
           </a:p>
@@ -3633,6 +3633,244 @@
           </a:p>
         </p:txBody>
       </p:sp>
+      <p:sp>
+        <p:nvSpPr>
+          <p:cNvPr id="3" name="TextBox 2">
+            <a:extLst>
+              <a:ext uri="{FF2B5EF4-FFF2-40B4-BE49-F238E27FC236}">
+                <a16:creationId xmlns:a16="http://schemas.microsoft.com/office/drawing/2014/main" id="{80754B1A-CC8E-407E-93A2-3D2381B438E4}"/>
+              </a:ext>
+            </a:extLst>
+          </p:cNvPr>
+          <p:cNvSpPr txBox="1"/>
+          <p:nvPr/>
+        </p:nvSpPr>
+        <p:spPr>
+          <a:xfrm>
+            <a:off x="4212527" y="3249406"/>
+            <a:ext cx="720090" cy="369332"/>
+          </a:xfrm>
+          <a:prstGeom prst="rect">
+            <a:avLst/>
+          </a:prstGeom>
+          <a:noFill/>
+        </p:spPr>
+        <p:txBody>
+          <a:bodyPr vert="horz" rtlCol="0">
+            <a:spAutoFit/>
+          </a:bodyPr>
+          <a:lstStyle/>
+          <a:p>
+            <a:pPr algn="ctr"/>
+            <a:r>
+              <a:rPr lang="en-US"/>
+              <a:t>S1</a:t>
+            </a:r>
+          </a:p>
+        </p:txBody>
+      </p:sp>
+      <p:sp>
+        <p:nvSpPr>
+          <p:cNvPr id="4" name="TextBox 3">
+            <a:extLst>
+              <a:ext uri="{FF2B5EF4-FFF2-40B4-BE49-F238E27FC236}">
+                <a16:creationId xmlns:a16="http://schemas.microsoft.com/office/drawing/2014/main" id="{A0E9716F-09BD-446F-9203-3363A10D16B7}"/>
+              </a:ext>
+            </a:extLst>
+          </p:cNvPr>
+          <p:cNvSpPr txBox="1"/>
+          <p:nvPr/>
+        </p:nvSpPr>
+        <p:spPr>
+          <a:xfrm>
+            <a:off x="4932616" y="3249406"/>
+            <a:ext cx="720090" cy="369332"/>
+          </a:xfrm>
+          <a:prstGeom prst="rect">
+            <a:avLst/>
+          </a:prstGeom>
+          <a:noFill/>
+        </p:spPr>
+        <p:txBody>
+          <a:bodyPr vert="horz" rtlCol="0">
+            <a:spAutoFit/>
+          </a:bodyPr>
+          <a:lstStyle/>
+          <a:p>
+            <a:pPr algn="ctr"/>
+            <a:r>
+              <a:rPr lang="en-US"/>
+              <a:t>S2</a:t>
+            </a:r>
+          </a:p>
+        </p:txBody>
+      </p:sp>
+      <p:sp>
+        <p:nvSpPr>
+          <p:cNvPr id="5" name="TextBox 4">
+            <a:extLst>
+              <a:ext uri="{FF2B5EF4-FFF2-40B4-BE49-F238E27FC236}">
+                <a16:creationId xmlns:a16="http://schemas.microsoft.com/office/drawing/2014/main" id="{B16DC481-5EB2-4624-9D76-AD021A55B541}"/>
+              </a:ext>
+            </a:extLst>
+          </p:cNvPr>
+          <p:cNvSpPr txBox="1"/>
+          <p:nvPr/>
+        </p:nvSpPr>
+        <p:spPr>
+          <a:xfrm>
+            <a:off x="3492436" y="3249406"/>
+            <a:ext cx="720090" cy="369332"/>
+          </a:xfrm>
+          <a:prstGeom prst="rect">
+            <a:avLst/>
+          </a:prstGeom>
+          <a:noFill/>
+        </p:spPr>
+        <p:txBody>
+          <a:bodyPr vert="horz" rtlCol="0">
+            <a:spAutoFit/>
+          </a:bodyPr>
+          <a:lstStyle/>
+          <a:p>
+            <a:pPr algn="ctr"/>
+            <a:r>
+              <a:rPr lang="en-US"/>
+              <a:t>S3</a:t>
+            </a:r>
+          </a:p>
+        </p:txBody>
+      </p:sp>
+      <p:cxnSp>
+        <p:nvCxnSpPr>
+          <p:cNvPr id="6" name="Straight Connector 5">
+            <a:extLst>
+              <a:ext uri="{FF2B5EF4-FFF2-40B4-BE49-F238E27FC236}">
+                <a16:creationId xmlns:a16="http://schemas.microsoft.com/office/drawing/2014/main" id="{B93A02D2-593C-4DD8-BD1E-8860C975DC7E}"/>
+              </a:ext>
+            </a:extLst>
+          </p:cNvPr>
+          <p:cNvCxnSpPr/>
+          <p:nvPr/>
+        </p:nvCxnSpPr>
+        <p:spPr>
+          <a:xfrm>
+            <a:off x="4572572" y="3429429"/>
+            <a:ext cx="720089" cy="0"/>
+          </a:xfrm>
+          <a:prstGeom prst="line">
+            <a:avLst/>
+          </a:prstGeom>
+          <a:ln w="19050">
+            <a:solidFill>
+              <a:srgbClr val="000000"/>
+            </a:solidFill>
+            <a:tailEnd type="triangle" w="med" len="lg"/>
+          </a:ln>
+        </p:spPr>
+        <p:style>
+          <a:lnRef idx="1">
+            <a:schemeClr val="accent1"/>
+          </a:lnRef>
+          <a:fillRef idx="0">
+            <a:schemeClr val="accent1"/>
+          </a:fillRef>
+          <a:effectRef idx="0">
+            <a:schemeClr val="accent1"/>
+          </a:effectRef>
+          <a:fontRef idx="minor">
+            <a:schemeClr val="tx1"/>
+          </a:fontRef>
+        </p:style>
+      </p:cxnSp>
+      <p:cxnSp>
+        <p:nvCxnSpPr>
+          <p:cNvPr id="7" name="Straight Connector 6">
+            <a:extLst>
+              <a:ext uri="{FF2B5EF4-FFF2-40B4-BE49-F238E27FC236}">
+                <a16:creationId xmlns:a16="http://schemas.microsoft.com/office/drawing/2014/main" id="{979A8641-0CDC-4070-8C70-40B634E9BD93}"/>
+              </a:ext>
+            </a:extLst>
+          </p:cNvPr>
+          <p:cNvCxnSpPr/>
+          <p:nvPr/>
+        </p:nvCxnSpPr>
+        <p:spPr>
+          <a:xfrm flipH="1">
+            <a:off x="3852482" y="3429429"/>
+            <a:ext cx="720090" cy="0"/>
+          </a:xfrm>
+          <a:prstGeom prst="line">
+            <a:avLst/>
+          </a:prstGeom>
+          <a:ln w="19050">
+            <a:solidFill>
+              <a:srgbClr val="000000"/>
+            </a:solidFill>
+            <a:tailEnd type="triangle" w="med" len="lg"/>
+          </a:ln>
+        </p:spPr>
+        <p:style>
+          <a:lnRef idx="1">
+            <a:schemeClr val="accent1"/>
+          </a:lnRef>
+          <a:fillRef idx="0">
+            <a:schemeClr val="accent1"/>
+          </a:fillRef>
+          <a:effectRef idx="0">
+            <a:schemeClr val="accent1"/>
+          </a:effectRef>
+          <a:fontRef idx="minor">
+            <a:schemeClr val="tx1"/>
+          </a:fontRef>
+        </p:style>
+      </p:cxnSp>
+      <p:cxnSp>
+        <p:nvCxnSpPr>
+          <p:cNvPr id="8" name="Straight Arrow Connector 7">
+            <a:extLst>
+              <a:ext uri="{FF2B5EF4-FFF2-40B4-BE49-F238E27FC236}">
+                <a16:creationId xmlns:a16="http://schemas.microsoft.com/office/drawing/2014/main" id="{1F89E088-16CB-4C46-A228-49600DAB2E69}"/>
+              </a:ext>
+            </a:extLst>
+          </p:cNvPr>
+          <p:cNvCxnSpPr>
+            <a:cxnSpLocks/>
+            <a:stCxn id="3" idx="3"/>
+            <a:endCxn id="4" idx="1"/>
+          </p:cNvCxnSpPr>
+          <p:nvPr/>
+        </p:nvCxnSpPr>
+        <p:spPr>
+          <a:xfrm flipH="1">
+            <a:off x="4932616" y="3434072"/>
+            <a:ext cx="1" cy="0"/>
+          </a:xfrm>
+          <a:prstGeom prst="straightConnector1">
+            <a:avLst/>
+          </a:prstGeom>
+          <a:ln w="19050">
+            <a:solidFill>
+              <a:srgbClr val="004B7D"/>
+            </a:solidFill>
+            <a:tailEnd type="triangle" w="med" len="lg"/>
+          </a:ln>
+        </p:spPr>
+        <p:style>
+          <a:lnRef idx="1">
+            <a:schemeClr val="accent1"/>
+          </a:lnRef>
+          <a:fillRef idx="0">
+            <a:schemeClr val="accent1"/>
+          </a:fillRef>
+          <a:effectRef idx="0">
+            <a:schemeClr val="accent1"/>
+          </a:effectRef>
+          <a:fontRef idx="minor">
+            <a:schemeClr val="tx1"/>
+          </a:fontRef>
+        </p:style>
+      </p:cxnSp>
     </p:spTree>
     <p:extLst>
       <p:ext uri="{BB962C8B-B14F-4D97-AF65-F5344CB8AC3E}">

</xml_diff>